<commit_message>
Updating files from workshop
</commit_message>
<xml_diff>
--- a/A Day of JavaScript Slides.pptx
+++ b/A Day of JavaScript Slides.pptx
@@ -10854,6 +10854,13 @@
   <p:clrMapOvr>
     <a:masterClrMapping/>
   </p:clrMapOvr>
+  <p:timing>
+    <p:tnLst>
+      <p:par>
+        <p:cTn id="1" dur="indefinite" restart="never" nodeType="tmRoot"/>
+      </p:par>
+    </p:tnLst>
+  </p:timing>
 </p:sld>
 </file>
 
@@ -13634,6 +13641,29 @@
               </a:rPr>
               <a:t>courses</a:t>
             </a:r>
+            <a:br>
+              <a:rPr lang="en-US" sz="4000" b="0" dirty="0" smtClean="0">
+                <a:latin typeface="Open Sans" charset="0"/>
+                <a:ea typeface="Open Sans" charset="0"/>
+                <a:cs typeface="Open Sans" charset="0"/>
+              </a:rPr>
+            </a:br>
+            <a:r>
+              <a:rPr lang="en-US" sz="4000" dirty="0" err="1" smtClean="0"/>
+              <a:t>javascriptforwp.com</a:t>
+            </a:r>
+            <a:r>
+              <a:rPr lang="en-US" sz="4000" dirty="0" smtClean="0"/>
+              <a:t>/</a:t>
+            </a:r>
+            <a:r>
+              <a:rPr lang="en-US" sz="4000" b="0" dirty="0" smtClean="0">
+                <a:latin typeface="Open Sans" charset="0"/>
+                <a:ea typeface="Open Sans" charset="0"/>
+                <a:cs typeface="Open Sans" charset="0"/>
+              </a:rPr>
+              <a:t>blog</a:t>
+            </a:r>
             <a:endParaRPr lang="en-US" sz="4000" b="0" dirty="0">
               <a:latin typeface="Open Sans" charset="0"/>
               <a:ea typeface="Open Sans" charset="0"/>
@@ -18225,7 +18255,7 @@
               <a:t>( </a:t>
             </a:r>
             <a:r>
-              <a:rPr lang="en-US" sz="1600" dirty="0" err="1">
+              <a:rPr lang="en-US" sz="1600" dirty="0" err="1" smtClean="0">
                 <a:solidFill>
                   <a:srgbClr val="A6E22E"/>
                 </a:solidFill>
@@ -18233,10 +18263,10 @@
                 <a:ea typeface="Source Code Pro" charset="0"/>
                 <a:cs typeface="Source Code Pro" charset="0"/>
               </a:rPr>
-              <a:t>post</a:t>
-            </a:r>
-            <a:r>
-              <a:rPr lang="en-US" sz="1600" dirty="0" err="1">
+              <a:t>this</a:t>
+            </a:r>
+            <a:r>
+              <a:rPr lang="en-US" sz="1600" dirty="0" err="1" smtClean="0">
                 <a:solidFill>
                   <a:srgbClr val="F8F8F2"/>
                 </a:solidFill>
@@ -18247,7 +18277,7 @@
               <a:t>.</a:t>
             </a:r>
             <a:r>
-              <a:rPr lang="en-US" sz="1600" dirty="0" err="1">
+              <a:rPr lang="en-US" sz="1600" dirty="0" err="1" smtClean="0">
                 <a:solidFill>
                   <a:srgbClr val="A6E22E"/>
                 </a:solidFill>
@@ -18258,7 +18288,7 @@
               <a:t>title</a:t>
             </a:r>
             <a:r>
-              <a:rPr lang="en-US" sz="1600" dirty="0">
+              <a:rPr lang="en-US" sz="1600" dirty="0" smtClean="0">
                 <a:solidFill>
                   <a:srgbClr val="F8F8F2"/>
                 </a:solidFill>
@@ -18266,7 +18296,18 @@
                 <a:ea typeface="Source Code Pro" charset="0"/>
                 <a:cs typeface="Source Code Pro" charset="0"/>
               </a:rPr>
-              <a:t> );</a:t>
+              <a:t> </a:t>
+            </a:r>
+            <a:r>
+              <a:rPr lang="en-US" sz="1600" dirty="0">
+                <a:solidFill>
+                  <a:srgbClr val="F8F8F2"/>
+                </a:solidFill>
+                <a:latin typeface="Source Code Pro" charset="0"/>
+                <a:ea typeface="Source Code Pro" charset="0"/>
+                <a:cs typeface="Source Code Pro" charset="0"/>
+              </a:rPr>
+              <a:t>);</a:t>
             </a:r>
           </a:p>
           <a:p>
@@ -21097,10 +21138,19 @@
                 </a:solidFill>
                 <a:latin typeface="Monaco" charset="0"/>
               </a:rPr>
-              <a:t> ( </a:t>
-            </a:r>
-            <a:r>
-              <a:rPr lang="en-US" sz="1800" dirty="0">
+              <a:t> </a:t>
+            </a:r>
+            <a:r>
+              <a:rPr lang="en-US" sz="1800" dirty="0" smtClean="0">
+                <a:solidFill>
+                  <a:srgbClr val="F8F8F2"/>
+                </a:solidFill>
+                <a:latin typeface="Monaco" charset="0"/>
+              </a:rPr>
+              <a:t>( </a:t>
+            </a:r>
+            <a:r>
+              <a:rPr lang="en-US" sz="1800" dirty="0" smtClean="0">
                 <a:solidFill>
                   <a:srgbClr val="66D9EF"/>
                 </a:solidFill>
@@ -21109,7 +21159,7 @@
               <a:t>true</a:t>
             </a:r>
             <a:r>
-              <a:rPr lang="en-US" sz="1800" dirty="0">
+              <a:rPr lang="en-US" sz="1800" dirty="0" smtClean="0">
                 <a:solidFill>
                   <a:srgbClr val="F8F8F2"/>
                 </a:solidFill>
@@ -21118,7 +21168,7 @@
               <a:t> </a:t>
             </a:r>
             <a:r>
-              <a:rPr lang="en-US" sz="1800" dirty="0">
+              <a:rPr lang="en-US" sz="1800" dirty="0" smtClean="0">
                 <a:solidFill>
                   <a:srgbClr val="F92672"/>
                 </a:solidFill>
@@ -21127,7 +21177,7 @@
               <a:t>===</a:t>
             </a:r>
             <a:r>
-              <a:rPr lang="en-US" sz="1800" dirty="0">
+              <a:rPr lang="en-US" sz="1800" dirty="0" smtClean="0">
                 <a:solidFill>
                   <a:srgbClr val="F8F8F2"/>
                 </a:solidFill>
@@ -21136,7 +21186,7 @@
               <a:t> </a:t>
             </a:r>
             <a:r>
-              <a:rPr lang="en-US" sz="1800" dirty="0" err="1">
+              <a:rPr lang="en-US" sz="1800" dirty="0" err="1" smtClean="0">
                 <a:solidFill>
                   <a:srgbClr val="A6E22E"/>
                 </a:solidFill>
@@ -21145,7 +21195,7 @@
               <a:t>loggedIn</a:t>
             </a:r>
             <a:r>
-              <a:rPr lang="en-US" sz="1800" dirty="0">
+              <a:rPr lang="en-US" sz="1800" dirty="0" smtClean="0">
                 <a:solidFill>
                   <a:srgbClr val="F8F8F2"/>
                 </a:solidFill>
@@ -26120,7 +26170,7 @@
           </a:p>
           <a:p>
             <a:r>
-              <a:rPr lang="en-US" sz="2400" dirty="0" err="1">
+              <a:rPr lang="en-US" sz="2400" dirty="0" err="1" smtClean="0">
                 <a:solidFill>
                   <a:srgbClr val="A6E22E"/>
                 </a:solidFill>
@@ -26129,7 +26179,7 @@
               <a:t>input</a:t>
             </a:r>
             <a:r>
-              <a:rPr lang="en-US" sz="2400" dirty="0" err="1">
+              <a:rPr lang="en-US" sz="2400" dirty="0" err="1" smtClean="0">
                 <a:solidFill>
                   <a:srgbClr val="F8F8F2"/>
                 </a:solidFill>
@@ -26138,7 +26188,7 @@
               <a:t>.</a:t>
             </a:r>
             <a:r>
-              <a:rPr lang="en-US" sz="2400" dirty="0" err="1">
+              <a:rPr lang="en-US" sz="2400" dirty="0" err="1" smtClean="0">
                 <a:solidFill>
                   <a:srgbClr val="A6E22E"/>
                 </a:solidFill>
@@ -27435,7 +27485,7 @@
         </p:nvSpPr>
         <p:spPr>
           <a:xfrm>
-            <a:off x="4940490" y="900751"/>
+            <a:off x="4958778" y="1124568"/>
             <a:ext cx="7924800" cy="3125338"/>
           </a:xfrm>
           <a:prstGeom prst="rect">
@@ -27672,95 +27722,109 @@
                 </a:solidFill>
                 <a:latin typeface="Monaco" charset="0"/>
               </a:rPr>
-              <a:t>previousSibling</a:t>
+              <a:t>firstElementChild</a:t>
             </a:r>
             <a:r>
               <a:rPr lang="en-US" sz="2200" dirty="0" smtClean="0">
                 <a:solidFill>
+                  <a:srgbClr val="A6E22E"/>
+                </a:solidFill>
+                <a:latin typeface="Monaco" charset="0"/>
+              </a:rPr>
+              <a:t>  	 </a:t>
+            </a:r>
+          </a:p>
+          <a:p>
+            <a:r>
+              <a:rPr lang="en-US" sz="2200" dirty="0" smtClean="0">
+                <a:solidFill>
                   <a:srgbClr val="F8F8F2"/>
                 </a:solidFill>
                 <a:latin typeface="Monaco" charset="0"/>
               </a:rPr>
+              <a:t>.</a:t>
+            </a:r>
+            <a:r>
+              <a:rPr lang="en-US" sz="2200" dirty="0" err="1" smtClean="0">
+                <a:solidFill>
+                  <a:srgbClr val="A6E22E"/>
+                </a:solidFill>
+                <a:latin typeface="Monaco" charset="0"/>
+              </a:rPr>
+              <a:t>lastElementChild</a:t>
+            </a:r>
+            <a:endParaRPr lang="en-US" sz="2200" dirty="0" smtClean="0">
+              <a:solidFill>
+                <a:srgbClr val="A6E22E"/>
+              </a:solidFill>
+              <a:latin typeface="Monaco" charset="0"/>
+            </a:endParaRPr>
+          </a:p>
+          <a:p>
+            <a:r>
+              <a:rPr lang="en-US" sz="2200" dirty="0">
+                <a:solidFill>
+                  <a:srgbClr val="F8F8F2"/>
+                </a:solidFill>
+                <a:latin typeface="Monaco" charset="0"/>
+              </a:rPr>
+              <a:t>.</a:t>
+            </a:r>
+            <a:r>
+              <a:rPr lang="en-US" sz="2200" dirty="0" err="1">
+                <a:solidFill>
+                  <a:srgbClr val="A6E22E"/>
+                </a:solidFill>
+                <a:latin typeface="Monaco" charset="0"/>
+              </a:rPr>
+              <a:t>nextElementSibling</a:t>
+            </a:r>
+            <a:r>
+              <a:rPr lang="en-US" sz="2200" dirty="0">
+                <a:solidFill>
+                  <a:srgbClr val="F8F8F2"/>
+                </a:solidFill>
+                <a:latin typeface="Monaco" charset="0"/>
+              </a:rPr>
+              <a:t>	</a:t>
+            </a:r>
+            <a:endParaRPr lang="en-US" sz="2200" dirty="0" smtClean="0">
+              <a:solidFill>
+                <a:srgbClr val="A6E22E"/>
+              </a:solidFill>
+              <a:latin typeface="Monaco" charset="0"/>
+            </a:endParaRPr>
+          </a:p>
+          <a:p>
+            <a:r>
+              <a:rPr lang="en-US" sz="2200" dirty="0" smtClean="0">
+                <a:solidFill>
+                  <a:srgbClr val="F8F8F2"/>
+                </a:solidFill>
+                <a:latin typeface="Monaco" charset="0"/>
+              </a:rPr>
+              <a:t>.</a:t>
+            </a:r>
+            <a:r>
+              <a:rPr lang="en-US" sz="2200" dirty="0" err="1">
+                <a:solidFill>
+                  <a:srgbClr val="A6E22E"/>
+                </a:solidFill>
+                <a:latin typeface="Monaco" charset="0"/>
+              </a:rPr>
+              <a:t>previousElementSibling</a:t>
+            </a:r>
+            <a:r>
+              <a:rPr lang="en-US" sz="2200" dirty="0">
+                <a:solidFill>
+                  <a:srgbClr val="F8F8F2"/>
+                </a:solidFill>
+                <a:latin typeface="Monaco" charset="0"/>
+              </a:rPr>
               <a:t>	   </a:t>
             </a:r>
           </a:p>
           <a:p>
-            <a:r>
-              <a:rPr lang="en-US" sz="2200" dirty="0" smtClean="0">
-                <a:solidFill>
-                  <a:srgbClr val="F8F8F2"/>
-                </a:solidFill>
-                <a:latin typeface="Monaco" charset="0"/>
-              </a:rPr>
-              <a:t>.</a:t>
-            </a:r>
-            <a:r>
-              <a:rPr lang="en-US" sz="2200" dirty="0" err="1" smtClean="0">
-                <a:solidFill>
-                  <a:srgbClr val="A6E22E"/>
-                </a:solidFill>
-                <a:latin typeface="Monaco" charset="0"/>
-              </a:rPr>
-              <a:t>firstElementChild</a:t>
-            </a:r>
-            <a:r>
-              <a:rPr lang="en-US" sz="2200" dirty="0" smtClean="0">
-                <a:solidFill>
-                  <a:srgbClr val="A6E22E"/>
-                </a:solidFill>
-                <a:latin typeface="Monaco" charset="0"/>
-              </a:rPr>
-              <a:t>  	 </a:t>
-            </a:r>
-          </a:p>
-          <a:p>
-            <a:r>
-              <a:rPr lang="en-US" sz="2200" dirty="0" smtClean="0">
-                <a:solidFill>
-                  <a:srgbClr val="F8F8F2"/>
-                </a:solidFill>
-                <a:latin typeface="Monaco" charset="0"/>
-              </a:rPr>
-              <a:t>.</a:t>
-            </a:r>
-            <a:r>
-              <a:rPr lang="en-US" sz="2200" dirty="0" err="1" smtClean="0">
-                <a:solidFill>
-                  <a:srgbClr val="A6E22E"/>
-                </a:solidFill>
-                <a:latin typeface="Monaco" charset="0"/>
-              </a:rPr>
-              <a:t>nextSibling</a:t>
-            </a:r>
-            <a:r>
-              <a:rPr lang="en-US" sz="2200" dirty="0" smtClean="0">
-                <a:solidFill>
-                  <a:srgbClr val="F8F8F2"/>
-                </a:solidFill>
-                <a:latin typeface="Monaco" charset="0"/>
-              </a:rPr>
-              <a:t>	</a:t>
-            </a:r>
-          </a:p>
-          <a:p>
-            <a:r>
-              <a:rPr lang="en-US" sz="2200" dirty="0" smtClean="0">
-                <a:solidFill>
-                  <a:srgbClr val="F8F8F2"/>
-                </a:solidFill>
-                <a:latin typeface="Monaco" charset="0"/>
-              </a:rPr>
-              <a:t>.</a:t>
-            </a:r>
-            <a:r>
-              <a:rPr lang="en-US" sz="2200" dirty="0" err="1" smtClean="0">
-                <a:solidFill>
-                  <a:srgbClr val="A6E22E"/>
-                </a:solidFill>
-                <a:latin typeface="Monaco" charset="0"/>
-              </a:rPr>
-              <a:t>lastChild</a:t>
-            </a:r>
             <a:endParaRPr lang="en-US" sz="2200" dirty="0">
               <a:solidFill>
                 <a:srgbClr val="F8F8F2"/>
@@ -29054,41 +29118,20 @@
               <a:t>appendChild</a:t>
             </a:r>
             <a:r>
-              <a:rPr lang="en-US" sz="2800" dirty="0">
+              <a:rPr lang="en-US" sz="2800" dirty="0" smtClean="0">
                 <a:solidFill>
                   <a:srgbClr val="F8F8F2"/>
                 </a:solidFill>
                 <a:latin typeface="Monaco" charset="0"/>
               </a:rPr>
-              <a:t>( </a:t>
-            </a:r>
-            <a:r>
-              <a:rPr lang="en-US" sz="2800" dirty="0" err="1">
-                <a:solidFill>
-                  <a:srgbClr val="A6E22E"/>
-                </a:solidFill>
-                <a:latin typeface="Monaco" charset="0"/>
-              </a:rPr>
-              <a:t>childEl</a:t>
-            </a:r>
-            <a:r>
-              <a:rPr lang="en-US" sz="2800" dirty="0">
-                <a:solidFill>
-                  <a:srgbClr val="F8F8F2"/>
-                </a:solidFill>
-                <a:latin typeface="Monaco" charset="0"/>
-              </a:rPr>
-              <a:t> </a:t>
-            </a:r>
-            <a:r>
-              <a:rPr lang="en-US" sz="2800" dirty="0" smtClean="0">
-                <a:solidFill>
-                  <a:srgbClr val="F8F8F2"/>
-                </a:solidFill>
-                <a:latin typeface="Monaco" charset="0"/>
-              </a:rPr>
-              <a:t>)</a:t>
-            </a:r>
+              <a:t>( child )</a:t>
+            </a:r>
+            <a:endParaRPr lang="en-US" sz="2800" dirty="0" smtClean="0">
+              <a:solidFill>
+                <a:srgbClr val="F8F8F2"/>
+              </a:solidFill>
+              <a:latin typeface="Monaco" charset="0"/>
+            </a:endParaRPr>
           </a:p>
           <a:p>
             <a:pPr>
@@ -31490,10 +31533,7 @@
               <a:buFont typeface="+mj-lt"/>
               <a:buAutoNum type="arabicPeriod"/>
             </a:pPr>
-            <a:r>
-              <a:rPr lang="en-US" dirty="0" smtClean="0"/>
-              <a:t>Create a post with markup using JavaScript</a:t>
-            </a:r>
+            <a:endParaRPr lang="en-US" sz="2600" dirty="0" smtClean="0"/>
           </a:p>
           <a:p>
             <a:pPr marL="457200" lvl="1" indent="-457200">
@@ -31506,10 +31546,7 @@
               <a:buFont typeface="+mj-lt"/>
               <a:buAutoNum type="arabicPeriod"/>
             </a:pPr>
-            <a:r>
-              <a:rPr lang="en-US" dirty="0" smtClean="0"/>
-              <a:t>Append post to the list of other posts on the page</a:t>
-            </a:r>
+            <a:endParaRPr lang="en-US" sz="2600" dirty="0"/>
           </a:p>
           <a:p>
             <a:pPr marL="457200" lvl="1" indent="-457200">
@@ -31522,7 +31559,43 @@
               <a:buFont typeface="+mj-lt"/>
               <a:buAutoNum type="arabicPeriod"/>
             </a:pPr>
-            <a:endParaRPr lang="en-US" dirty="0" smtClean="0"/>
+            <a:r>
+              <a:rPr lang="en-US" sz="2600" dirty="0" smtClean="0"/>
+              <a:t>Create </a:t>
+            </a:r>
+            <a:r>
+              <a:rPr lang="en-US" sz="2600" dirty="0" smtClean="0"/>
+              <a:t>a post with markup using JavaScript</a:t>
+            </a:r>
+          </a:p>
+          <a:p>
+            <a:pPr marL="457200" lvl="1" indent="-457200">
+              <a:lnSpc>
+                <a:spcPct val="100000"/>
+              </a:lnSpc>
+              <a:spcBef>
+                <a:spcPts val="0"/>
+              </a:spcBef>
+              <a:buFont typeface="+mj-lt"/>
+              <a:buAutoNum type="arabicPeriod"/>
+            </a:pPr>
+            <a:r>
+              <a:rPr lang="en-US" sz="2600" dirty="0" smtClean="0"/>
+              <a:t>Append post to the list of other posts on the page</a:t>
+            </a:r>
+          </a:p>
+          <a:p>
+            <a:pPr marL="457200" lvl="1" indent="-457200">
+              <a:lnSpc>
+                <a:spcPct val="100000"/>
+              </a:lnSpc>
+              <a:spcBef>
+                <a:spcPts val="0"/>
+              </a:spcBef>
+              <a:buFont typeface="+mj-lt"/>
+              <a:buAutoNum type="arabicPeriod"/>
+            </a:pPr>
+            <a:endParaRPr lang="en-US" sz="2600" dirty="0" smtClean="0"/>
           </a:p>
         </p:txBody>
       </p:sp>
@@ -31542,6 +31615,40 @@
           <a:lstStyle/>
           <a:p>
             <a:endParaRPr lang="en-US"/>
+          </a:p>
+        </p:txBody>
+      </p:sp>
+      <p:sp>
+        <p:nvSpPr>
+          <p:cNvPr id="5" name="TextBox 4"/>
+          <p:cNvSpPr txBox="1"/>
+          <p:nvPr/>
+        </p:nvSpPr>
+        <p:spPr>
+          <a:xfrm>
+            <a:off x="2834640" y="2432304"/>
+            <a:ext cx="914400" cy="914400"/>
+          </a:xfrm>
+          <a:prstGeom prst="rect">
+            <a:avLst/>
+          </a:prstGeom>
+          <a:noFill/>
+        </p:spPr>
+        <p:txBody>
+          <a:bodyPr wrap="none" lIns="0" tIns="0" rIns="0" bIns="0" rtlCol="0">
+            <a:noAutofit/>
+          </a:bodyPr>
+          <a:lstStyle/>
+          <a:p>
+            <a:pPr>
+              <a:lnSpc>
+                <a:spcPct val="110000"/>
+              </a:lnSpc>
+              <a:spcBef>
+                <a:spcPts val="800"/>
+              </a:spcBef>
+            </a:pPr>
+            <a:endParaRPr lang="en-US" dirty="0" smtClean="0"/>
           </a:p>
         </p:txBody>
       </p:sp>
@@ -31630,10 +31737,7 @@
               <a:buFont typeface="+mj-lt"/>
               <a:buAutoNum type="arabicPeriod"/>
             </a:pPr>
-            <a:r>
-              <a:rPr lang="en-US" dirty="0" smtClean="0"/>
-              <a:t>Write a function to append post content to the page</a:t>
-            </a:r>
+            <a:endParaRPr lang="en-US" sz="2400" dirty="0" smtClean="0"/>
           </a:p>
           <a:p>
             <a:pPr marL="457200" lvl="1" indent="-457200">
@@ -31646,10 +31750,7 @@
               <a:buFont typeface="+mj-lt"/>
               <a:buAutoNum type="arabicPeriod"/>
             </a:pPr>
-            <a:r>
-              <a:rPr lang="en-US" dirty="0" smtClean="0"/>
-              <a:t>Create a post object with a title and content</a:t>
-            </a:r>
+            <a:endParaRPr lang="en-US" sz="2400" dirty="0" smtClean="0"/>
           </a:p>
           <a:p>
             <a:pPr marL="457200" lvl="1" indent="-457200">
@@ -31663,7 +31764,43 @@
               <a:buAutoNum type="arabicPeriod"/>
             </a:pPr>
             <a:r>
-              <a:rPr lang="en-US" dirty="0" smtClean="0"/>
+              <a:rPr lang="en-US" sz="2400" dirty="0" smtClean="0"/>
+              <a:t>Write </a:t>
+            </a:r>
+            <a:r>
+              <a:rPr lang="en-US" sz="2400" dirty="0" smtClean="0"/>
+              <a:t>a function to append post content to the page</a:t>
+            </a:r>
+          </a:p>
+          <a:p>
+            <a:pPr marL="457200" lvl="1" indent="-457200">
+              <a:lnSpc>
+                <a:spcPct val="100000"/>
+              </a:lnSpc>
+              <a:spcBef>
+                <a:spcPts val="0"/>
+              </a:spcBef>
+              <a:buFont typeface="+mj-lt"/>
+              <a:buAutoNum type="arabicPeriod"/>
+            </a:pPr>
+            <a:r>
+              <a:rPr lang="en-US" sz="2400" dirty="0" smtClean="0"/>
+              <a:t>Create a post object with a title and content</a:t>
+            </a:r>
+          </a:p>
+          <a:p>
+            <a:pPr marL="457200" lvl="1" indent="-457200">
+              <a:lnSpc>
+                <a:spcPct val="100000"/>
+              </a:lnSpc>
+              <a:spcBef>
+                <a:spcPts val="0"/>
+              </a:spcBef>
+              <a:buFont typeface="+mj-lt"/>
+              <a:buAutoNum type="arabicPeriod"/>
+            </a:pPr>
+            <a:r>
+              <a:rPr lang="en-US" sz="2400" dirty="0" smtClean="0"/>
               <a:t>Call the function to append posts and pass it the post you created</a:t>
             </a:r>
           </a:p>
@@ -31773,10 +31910,7 @@
               <a:buFont typeface="+mj-lt"/>
               <a:buAutoNum type="arabicPeriod"/>
             </a:pPr>
-            <a:r>
-              <a:rPr lang="en-US" dirty="0" smtClean="0"/>
-              <a:t>Create a form with preset values</a:t>
-            </a:r>
+            <a:endParaRPr lang="en-US" sz="2400" dirty="0" smtClean="0"/>
           </a:p>
           <a:p>
             <a:pPr marL="457200" lvl="1" indent="-457200">
@@ -31789,8 +31923,54 @@
               <a:buFont typeface="+mj-lt"/>
               <a:buAutoNum type="arabicPeriod"/>
             </a:pPr>
-            <a:r>
-              <a:rPr lang="en-US" dirty="0" smtClean="0"/>
+            <a:endParaRPr lang="en-US" sz="2400" dirty="0"/>
+          </a:p>
+          <a:p>
+            <a:pPr marL="457200" lvl="1" indent="-457200">
+              <a:lnSpc>
+                <a:spcPct val="100000"/>
+              </a:lnSpc>
+              <a:spcBef>
+                <a:spcPts val="0"/>
+              </a:spcBef>
+              <a:buFont typeface="+mj-lt"/>
+              <a:buAutoNum type="arabicPeriod"/>
+            </a:pPr>
+            <a:endParaRPr lang="en-US" sz="2400" dirty="0" smtClean="0"/>
+          </a:p>
+          <a:p>
+            <a:pPr marL="457200" lvl="1" indent="-457200">
+              <a:lnSpc>
+                <a:spcPct val="100000"/>
+              </a:lnSpc>
+              <a:spcBef>
+                <a:spcPts val="0"/>
+              </a:spcBef>
+              <a:buFont typeface="+mj-lt"/>
+              <a:buAutoNum type="arabicPeriod"/>
+            </a:pPr>
+            <a:r>
+              <a:rPr lang="en-US" sz="2400" dirty="0" smtClean="0"/>
+              <a:t>Create </a:t>
+            </a:r>
+            <a:r>
+              <a:rPr lang="en-US" sz="2400" dirty="0" smtClean="0"/>
+              <a:t>a form with preset values</a:t>
+            </a:r>
+          </a:p>
+          <a:p>
+            <a:pPr marL="457200" lvl="1" indent="-457200">
+              <a:lnSpc>
+                <a:spcPct val="100000"/>
+              </a:lnSpc>
+              <a:spcBef>
+                <a:spcPts val="0"/>
+              </a:spcBef>
+              <a:buFont typeface="+mj-lt"/>
+              <a:buAutoNum type="arabicPeriod"/>
+            </a:pPr>
+            <a:r>
+              <a:rPr lang="en-US" sz="2400" dirty="0" smtClean="0"/>
               <a:t>Get the values from the form and log them in the console</a:t>
             </a:r>
           </a:p>
@@ -31974,8 +32154,8 @@
         </p:nvSpPr>
         <p:spPr>
           <a:xfrm>
-            <a:off x="609600" y="1246909"/>
-            <a:ext cx="7924800" cy="3347713"/>
+            <a:off x="609600" y="1655064"/>
+            <a:ext cx="7924800" cy="2939558"/>
           </a:xfrm>
         </p:spPr>
         <p:txBody>

</xml_diff>

<commit_message>
Updating workshop files and Readme
</commit_message>
<xml_diff>
--- a/A Day of JavaScript Slides.pptx
+++ b/A Day of JavaScript Slides.pptx
@@ -5,7 +5,7 @@
     <p:sldMasterId id="2147483648" r:id="rId1"/>
   </p:sldMasterIdLst>
   <p:notesMasterIdLst>
-    <p:notesMasterId r:id="rId91"/>
+    <p:notesMasterId r:id="rId94"/>
   </p:notesMasterIdLst>
   <p:sldIdLst>
     <p:sldId id="460" r:id="rId2"/>
@@ -97,6 +97,9 @@
     <p:sldId id="425" r:id="rId88"/>
     <p:sldId id="428" r:id="rId89"/>
     <p:sldId id="429" r:id="rId90"/>
+    <p:sldId id="463" r:id="rId91"/>
+    <p:sldId id="464" r:id="rId92"/>
+    <p:sldId id="465" r:id="rId93"/>
   </p:sldIdLst>
   <p:sldSz cx="9144000" cy="5143500" type="screen16x9"/>
   <p:notesSz cx="6858000" cy="9144000"/>
@@ -4611,6 +4614,184 @@
 </p:notes>
 </file>
 
+<file path=ppt/notesSlides/notesSlide48.xml><?xml version="1.0" encoding="utf-8"?>
+<p:notes xmlns:a="http://schemas.openxmlformats.org/drawingml/2006/main" xmlns:r="http://schemas.openxmlformats.org/officeDocument/2006/relationships" xmlns:p="http://schemas.openxmlformats.org/presentationml/2006/main">
+  <p:cSld>
+    <p:spTree>
+      <p:nvGrpSpPr>
+        <p:cNvPr id="1" name=""/>
+        <p:cNvGrpSpPr/>
+        <p:nvPr/>
+      </p:nvGrpSpPr>
+      <p:grpSpPr>
+        <a:xfrm>
+          <a:off x="0" y="0"/>
+          <a:ext cx="0" cy="0"/>
+          <a:chOff x="0" y="0"/>
+          <a:chExt cx="0" cy="0"/>
+        </a:xfrm>
+      </p:grpSpPr>
+      <p:sp>
+        <p:nvSpPr>
+          <p:cNvPr id="2" name="Slide Image Placeholder 1"/>
+          <p:cNvSpPr>
+            <a:spLocks noGrp="1" noRot="1" noChangeAspect="1"/>
+          </p:cNvSpPr>
+          <p:nvPr>
+            <p:ph type="sldImg"/>
+          </p:nvPr>
+        </p:nvSpPr>
+        <p:spPr/>
+      </p:sp>
+      <p:sp>
+        <p:nvSpPr>
+          <p:cNvPr id="3" name="Notes Placeholder 2"/>
+          <p:cNvSpPr>
+            <a:spLocks noGrp="1"/>
+          </p:cNvSpPr>
+          <p:nvPr>
+            <p:ph type="body" idx="1"/>
+          </p:nvPr>
+        </p:nvSpPr>
+        <p:spPr/>
+        <p:txBody>
+          <a:bodyPr/>
+          <a:lstStyle/>
+          <a:p>
+            <a:endParaRPr lang="en-US" dirty="0" smtClean="0">
+              <a:sym typeface="Wingdings"/>
+            </a:endParaRPr>
+          </a:p>
+        </p:txBody>
+      </p:sp>
+      <p:sp>
+        <p:nvSpPr>
+          <p:cNvPr id="4" name="Slide Number Placeholder 3"/>
+          <p:cNvSpPr>
+            <a:spLocks noGrp="1"/>
+          </p:cNvSpPr>
+          <p:nvPr>
+            <p:ph type="sldNum" sz="quarter" idx="10"/>
+          </p:nvPr>
+        </p:nvSpPr>
+        <p:spPr/>
+        <p:txBody>
+          <a:bodyPr/>
+          <a:lstStyle/>
+          <a:p>
+            <a:fld id="{0FF14FD4-8482-CC41-A2CF-24894EA3C62A}" type="slidenum">
+              <a:rPr lang="en-US" smtClean="0"/>
+              <a:t>90</a:t>
+            </a:fld>
+            <a:endParaRPr lang="en-US"/>
+          </a:p>
+        </p:txBody>
+      </p:sp>
+    </p:spTree>
+    <p:extLst>
+      <p:ext uri="{BB962C8B-B14F-4D97-AF65-F5344CB8AC3E}">
+        <p14:creationId xmlns:p14="http://schemas.microsoft.com/office/powerpoint/2010/main" val="823571471"/>
+      </p:ext>
+    </p:extLst>
+  </p:cSld>
+  <p:clrMapOvr>
+    <a:masterClrMapping/>
+  </p:clrMapOvr>
+</p:notes>
+</file>
+
+<file path=ppt/notesSlides/notesSlide49.xml><?xml version="1.0" encoding="utf-8"?>
+<p:notes xmlns:a="http://schemas.openxmlformats.org/drawingml/2006/main" xmlns:r="http://schemas.openxmlformats.org/officeDocument/2006/relationships" xmlns:p="http://schemas.openxmlformats.org/presentationml/2006/main">
+  <p:cSld>
+    <p:spTree>
+      <p:nvGrpSpPr>
+        <p:cNvPr id="1" name=""/>
+        <p:cNvGrpSpPr/>
+        <p:nvPr/>
+      </p:nvGrpSpPr>
+      <p:grpSpPr>
+        <a:xfrm>
+          <a:off x="0" y="0"/>
+          <a:ext cx="0" cy="0"/>
+          <a:chOff x="0" y="0"/>
+          <a:chExt cx="0" cy="0"/>
+        </a:xfrm>
+      </p:grpSpPr>
+      <p:sp>
+        <p:nvSpPr>
+          <p:cNvPr id="2" name="Slide Image Placeholder 1"/>
+          <p:cNvSpPr>
+            <a:spLocks noGrp="1" noRot="1" noChangeAspect="1"/>
+          </p:cNvSpPr>
+          <p:nvPr>
+            <p:ph type="sldImg"/>
+          </p:nvPr>
+        </p:nvSpPr>
+        <p:spPr/>
+      </p:sp>
+      <p:sp>
+        <p:nvSpPr>
+          <p:cNvPr id="3" name="Notes Placeholder 2"/>
+          <p:cNvSpPr>
+            <a:spLocks noGrp="1"/>
+          </p:cNvSpPr>
+          <p:nvPr>
+            <p:ph type="body" idx="1"/>
+          </p:nvPr>
+        </p:nvSpPr>
+        <p:spPr/>
+        <p:txBody>
+          <a:bodyPr/>
+          <a:lstStyle/>
+          <a:p>
+            <a:r>
+              <a:rPr lang="en-US" dirty="0" smtClean="0"/>
+              <a:t>Makes the DOM API way easier to work with.  Not going to look at today since we’re focused</a:t>
+            </a:r>
+            <a:r>
+              <a:rPr lang="en-US" baseline="0" dirty="0" smtClean="0"/>
+              <a:t> on working with vanilla JavaScript, but will see it in the while and not too hard to learn, especially once you know this.</a:t>
+            </a:r>
+            <a:endParaRPr lang="en-US" dirty="0"/>
+          </a:p>
+        </p:txBody>
+      </p:sp>
+      <p:sp>
+        <p:nvSpPr>
+          <p:cNvPr id="4" name="Slide Number Placeholder 3"/>
+          <p:cNvSpPr>
+            <a:spLocks noGrp="1"/>
+          </p:cNvSpPr>
+          <p:nvPr>
+            <p:ph type="sldNum" sz="quarter" idx="10"/>
+          </p:nvPr>
+        </p:nvSpPr>
+        <p:spPr/>
+        <p:txBody>
+          <a:bodyPr/>
+          <a:lstStyle/>
+          <a:p>
+            <a:fld id="{0FF14FD4-8482-CC41-A2CF-24894EA3C62A}" type="slidenum">
+              <a:rPr lang="en-US" smtClean="0"/>
+              <a:t>91</a:t>
+            </a:fld>
+            <a:endParaRPr lang="en-US"/>
+          </a:p>
+        </p:txBody>
+      </p:sp>
+    </p:spTree>
+    <p:extLst>
+      <p:ext uri="{BB962C8B-B14F-4D97-AF65-F5344CB8AC3E}">
+        <p14:creationId xmlns:p14="http://schemas.microsoft.com/office/powerpoint/2010/main" val="118614416"/>
+      </p:ext>
+    </p:extLst>
+  </p:cSld>
+  <p:clrMapOvr>
+    <a:masterClrMapping/>
+  </p:clrMapOvr>
+</p:notes>
+</file>
+
 <file path=ppt/notesSlides/notesSlide5.xml><?xml version="1.0" encoding="utf-8"?>
 <p:notes xmlns:a="http://schemas.openxmlformats.org/drawingml/2006/main" xmlns:r="http://schemas.openxmlformats.org/officeDocument/2006/relationships" xmlns:p="http://schemas.openxmlformats.org/presentationml/2006/main">
   <p:cSld>
@@ -4712,6 +4893,92 @@
     <p:extLst>
       <p:ext uri="{BB962C8B-B14F-4D97-AF65-F5344CB8AC3E}">
         <p14:creationId xmlns:p14="http://schemas.microsoft.com/office/powerpoint/2010/main" val="1107065996"/>
+      </p:ext>
+    </p:extLst>
+  </p:cSld>
+  <p:clrMapOvr>
+    <a:masterClrMapping/>
+  </p:clrMapOvr>
+</p:notes>
+</file>
+
+<file path=ppt/notesSlides/notesSlide50.xml><?xml version="1.0" encoding="utf-8"?>
+<p:notes xmlns:a="http://schemas.openxmlformats.org/drawingml/2006/main" xmlns:r="http://schemas.openxmlformats.org/officeDocument/2006/relationships" xmlns:p="http://schemas.openxmlformats.org/presentationml/2006/main">
+  <p:cSld>
+    <p:spTree>
+      <p:nvGrpSpPr>
+        <p:cNvPr id="1" name=""/>
+        <p:cNvGrpSpPr/>
+        <p:nvPr/>
+      </p:nvGrpSpPr>
+      <p:grpSpPr>
+        <a:xfrm>
+          <a:off x="0" y="0"/>
+          <a:ext cx="0" cy="0"/>
+          <a:chOff x="0" y="0"/>
+          <a:chExt cx="0" cy="0"/>
+        </a:xfrm>
+      </p:grpSpPr>
+      <p:sp>
+        <p:nvSpPr>
+          <p:cNvPr id="2" name="Slide Image Placeholder 1"/>
+          <p:cNvSpPr>
+            <a:spLocks noGrp="1" noRot="1" noChangeAspect="1"/>
+          </p:cNvSpPr>
+          <p:nvPr>
+            <p:ph type="sldImg"/>
+          </p:nvPr>
+        </p:nvSpPr>
+        <p:spPr/>
+      </p:sp>
+      <p:sp>
+        <p:nvSpPr>
+          <p:cNvPr id="3" name="Notes Placeholder 2"/>
+          <p:cNvSpPr>
+            <a:spLocks noGrp="1"/>
+          </p:cNvSpPr>
+          <p:nvPr>
+            <p:ph type="body" idx="1"/>
+          </p:nvPr>
+        </p:nvSpPr>
+        <p:spPr/>
+        <p:txBody>
+          <a:bodyPr/>
+          <a:lstStyle/>
+          <a:p>
+            <a:endParaRPr lang="en-US" dirty="0" smtClean="0">
+              <a:sym typeface="Wingdings"/>
+            </a:endParaRPr>
+          </a:p>
+        </p:txBody>
+      </p:sp>
+      <p:sp>
+        <p:nvSpPr>
+          <p:cNvPr id="4" name="Slide Number Placeholder 3"/>
+          <p:cNvSpPr>
+            <a:spLocks noGrp="1"/>
+          </p:cNvSpPr>
+          <p:nvPr>
+            <p:ph type="sldNum" sz="quarter" idx="10"/>
+          </p:nvPr>
+        </p:nvSpPr>
+        <p:spPr/>
+        <p:txBody>
+          <a:bodyPr/>
+          <a:lstStyle/>
+          <a:p>
+            <a:fld id="{0FF14FD4-8482-CC41-A2CF-24894EA3C62A}" type="slidenum">
+              <a:rPr lang="en-US" smtClean="0"/>
+              <a:t>92</a:t>
+            </a:fld>
+            <a:endParaRPr lang="en-US"/>
+          </a:p>
+        </p:txBody>
+      </p:sp>
+    </p:spTree>
+    <p:extLst>
+      <p:ext uri="{BB962C8B-B14F-4D97-AF65-F5344CB8AC3E}">
+        <p14:creationId xmlns:p14="http://schemas.microsoft.com/office/powerpoint/2010/main" val="635331407"/>
       </p:ext>
     </p:extLst>
   </p:cSld>
@@ -30845,7 +31112,11 @@
           <a:p>
             <a:r>
               <a:rPr lang="en-US" dirty="0" smtClean="0"/>
-              <a:t>DOM Practice #1</a:t>
+              <a:t>DOM Practice </a:t>
+            </a:r>
+            <a:r>
+              <a:rPr lang="en-US" dirty="0" smtClean="0"/>
+              <a:t>01.01</a:t>
             </a:r>
             <a:endParaRPr lang="en-US" dirty="0"/>
           </a:p>
@@ -30974,7 +31245,11 @@
           <a:p>
             <a:r>
               <a:rPr lang="en-US" dirty="0" smtClean="0"/>
-              <a:t>DOM Practice #2</a:t>
+              <a:t>DOM Practice </a:t>
+            </a:r>
+            <a:r>
+              <a:rPr lang="en-US" dirty="0" smtClean="0"/>
+              <a:t>01.02</a:t>
             </a:r>
             <a:endParaRPr lang="en-US" dirty="0"/>
           </a:p>
@@ -31502,7 +31777,11 @@
           <a:p>
             <a:r>
               <a:rPr lang="en-US" dirty="0" smtClean="0"/>
-              <a:t>DOM Practice #3</a:t>
+              <a:t>DOM Practice </a:t>
+            </a:r>
+            <a:r>
+              <a:rPr lang="en-US" dirty="0" smtClean="0"/>
+              <a:t>01.03</a:t>
             </a:r>
             <a:endParaRPr lang="en-US" dirty="0"/>
           </a:p>
@@ -31706,7 +31985,11 @@
           <a:p>
             <a:r>
               <a:rPr lang="en-US" dirty="0" smtClean="0"/>
-              <a:t>DOM Practice #4</a:t>
+              <a:t>DOM Practice </a:t>
+            </a:r>
+            <a:r>
+              <a:rPr lang="en-US" dirty="0" smtClean="0"/>
+              <a:t>**</a:t>
             </a:r>
             <a:endParaRPr lang="en-US" dirty="0"/>
           </a:p>
@@ -31879,7 +32162,11 @@
           <a:p>
             <a:r>
               <a:rPr lang="en-US" dirty="0" smtClean="0"/>
-              <a:t>DOM Practice #5</a:t>
+              <a:t>DOM Practice </a:t>
+            </a:r>
+            <a:r>
+              <a:rPr lang="en-US" dirty="0" smtClean="0"/>
+              <a:t>**</a:t>
             </a:r>
             <a:endParaRPr lang="en-US" dirty="0"/>
           </a:p>
@@ -31911,19 +32198,6 @@
               <a:buAutoNum type="arabicPeriod"/>
             </a:pPr>
             <a:endParaRPr lang="en-US" sz="2400" dirty="0" smtClean="0"/>
-          </a:p>
-          <a:p>
-            <a:pPr marL="457200" lvl="1" indent="-457200">
-              <a:lnSpc>
-                <a:spcPct val="100000"/>
-              </a:lnSpc>
-              <a:spcBef>
-                <a:spcPts val="0"/>
-              </a:spcBef>
-              <a:buFont typeface="+mj-lt"/>
-              <a:buAutoNum type="arabicPeriod"/>
-            </a:pPr>
-            <a:endParaRPr lang="en-US" sz="2400" dirty="0"/>
           </a:p>
           <a:p>
             <a:pPr marL="457200" lvl="1" indent="-457200">
@@ -36327,7 +36601,11 @@
           <a:p>
             <a:r>
               <a:rPr lang="en-US" dirty="0" smtClean="0"/>
-              <a:t>Events Practice #1</a:t>
+              <a:t>Events Practice </a:t>
+            </a:r>
+            <a:r>
+              <a:rPr lang="en-US" dirty="0" smtClean="0"/>
+              <a:t>02.01</a:t>
             </a:r>
             <a:endParaRPr lang="en-US" dirty="0"/>
           </a:p>
@@ -36442,7 +36720,11 @@
           <a:p>
             <a:r>
               <a:rPr lang="en-US" dirty="0" smtClean="0"/>
-              <a:t>Events Practice #2</a:t>
+              <a:t>Events Practice </a:t>
+            </a:r>
+            <a:r>
+              <a:rPr lang="en-US" dirty="0" smtClean="0"/>
+              <a:t>02.02</a:t>
             </a:r>
             <a:endParaRPr lang="en-US" dirty="0"/>
           </a:p>
@@ -36552,7 +36834,11 @@
           <a:p>
             <a:r>
               <a:rPr lang="en-US" dirty="0" smtClean="0"/>
-              <a:t>Events Practice #3</a:t>
+              <a:t>Events Practice </a:t>
+            </a:r>
+            <a:r>
+              <a:rPr lang="en-US" dirty="0" smtClean="0"/>
+              <a:t>02.03</a:t>
             </a:r>
             <a:endParaRPr lang="en-US" dirty="0"/>
           </a:p>
@@ -36990,7 +37276,9 @@
             <a:r>
               <a:rPr lang="mr-IN" sz="2000" dirty="0" smtClean="0">
                 <a:solidFill>
-                  <a:srgbClr val="F8F8F2"/>
+                  <a:schemeClr val="bg1">
+                    <a:lumMod val="95000"/>
+                  </a:schemeClr>
                 </a:solidFill>
                 <a:latin typeface="Monaco" charset="0"/>
               </a:rPr>
@@ -36998,7 +37286,9 @@
             </a:r>
             <a:endParaRPr lang="mr-IN" sz="2000" dirty="0">
               <a:solidFill>
-                <a:srgbClr val="F8F8F2"/>
+                <a:schemeClr val="bg1">
+                  <a:lumMod val="95000"/>
+                </a:schemeClr>
               </a:solidFill>
               <a:latin typeface="Monaco" charset="0"/>
             </a:endParaRPr>
@@ -37007,7 +37297,9 @@
             <a:r>
               <a:rPr lang="en-US" sz="2000" dirty="0" smtClean="0">
                 <a:solidFill>
-                  <a:srgbClr val="F92672"/>
+                  <a:schemeClr val="bg1">
+                    <a:lumMod val="95000"/>
+                  </a:schemeClr>
                 </a:solidFill>
                 <a:latin typeface="Monaco" charset="0"/>
               </a:rPr>
@@ -37016,45 +37308,103 @@
             <a:r>
               <a:rPr lang="en-US" sz="2000" dirty="0">
                 <a:solidFill>
-                  <a:srgbClr val="F92672"/>
-                </a:solidFill>
-                <a:latin typeface="Monaco" charset="0"/>
-              </a:rPr>
-              <a:t>title"</a:t>
+                  <a:schemeClr val="bg1">
+                    <a:lumMod val="95000"/>
+                  </a:schemeClr>
+                </a:solidFill>
+                <a:latin typeface="Monaco" charset="0"/>
+              </a:rPr>
+              <a:t>title": </a:t>
+            </a:r>
+            <a:r>
+              <a:rPr lang="en-US" sz="2000" dirty="0" smtClean="0">
+                <a:solidFill>
+                  <a:schemeClr val="bg1">
+                    <a:lumMod val="95000"/>
+                  </a:schemeClr>
+                </a:solidFill>
+                <a:latin typeface="Monaco" charset="0"/>
+              </a:rPr>
+              <a:t>2,  </a:t>
+            </a:r>
+          </a:p>
+          <a:p>
+            <a:r>
+              <a:rPr lang="en-US" sz="2000" dirty="0" smtClean="0">
+                <a:solidFill>
+                  <a:schemeClr val="bg1">
+                    <a:lumMod val="95000"/>
+                  </a:schemeClr>
+                </a:solidFill>
+                <a:latin typeface="Monaco" charset="0"/>
+              </a:rPr>
+              <a:t>  "</a:t>
             </a:r>
             <a:r>
               <a:rPr lang="en-US" sz="2000" dirty="0">
                 <a:solidFill>
-                  <a:srgbClr val="F8F8F2"/>
-                </a:solidFill>
-                <a:latin typeface="Monaco" charset="0"/>
-              </a:rPr>
-              <a:t>: </a:t>
-            </a:r>
+                  <a:schemeClr val="bg1">
+                    <a:lumMod val="95000"/>
+                  </a:schemeClr>
+                </a:solidFill>
+                <a:latin typeface="Monaco" charset="0"/>
+              </a:rPr>
+              <a:t>title": "Hello JSON!",</a:t>
+            </a:r>
+          </a:p>
+          <a:p>
             <a:r>
               <a:rPr lang="en-US" sz="2000" dirty="0" smtClean="0">
                 <a:solidFill>
-                  <a:srgbClr val="E6DB74"/>
-                </a:solidFill>
-                <a:latin typeface="Monaco" charset="0"/>
-              </a:rPr>
-              <a:t>2</a:t>
-            </a:r>
+                  <a:schemeClr val="bg1">
+                    <a:lumMod val="95000"/>
+                  </a:schemeClr>
+                </a:solidFill>
+                <a:latin typeface="Monaco" charset="0"/>
+              </a:rPr>
+              <a:t>  "</a:t>
+            </a:r>
+            <a:r>
+              <a:rPr lang="en-US" sz="2000" dirty="0">
+                <a:solidFill>
+                  <a:schemeClr val="bg1">
+                    <a:lumMod val="95000"/>
+                  </a:schemeClr>
+                </a:solidFill>
+                <a:latin typeface="Monaco" charset="0"/>
+              </a:rPr>
+              <a:t>slug": "hello-</a:t>
+            </a:r>
+            <a:r>
+              <a:rPr lang="en-US" sz="2000" dirty="0" err="1">
+                <a:solidFill>
+                  <a:schemeClr val="bg1">
+                    <a:lumMod val="95000"/>
+                  </a:schemeClr>
+                </a:solidFill>
+                <a:latin typeface="Monaco" charset="0"/>
+              </a:rPr>
+              <a:t>json</a:t>
+            </a:r>
+            <a:r>
+              <a:rPr lang="en-US" sz="2000" dirty="0">
+                <a:solidFill>
+                  <a:schemeClr val="bg1">
+                    <a:lumMod val="95000"/>
+                  </a:schemeClr>
+                </a:solidFill>
+                <a:latin typeface="Monaco" charset="0"/>
+              </a:rPr>
+              <a:t>",</a:t>
+            </a:r>
+          </a:p>
+          <a:p>
             <a:r>
               <a:rPr lang="en-US" sz="2000" dirty="0" smtClean="0">
                 <a:solidFill>
-                  <a:srgbClr val="F8F8F2"/>
-                </a:solidFill>
-                <a:latin typeface="Monaco" charset="0"/>
-              </a:rPr>
-              <a:t>,  </a:t>
-            </a:r>
-          </a:p>
-          <a:p>
-            <a:r>
-              <a:rPr lang="en-US" sz="2000" dirty="0" smtClean="0">
-                <a:solidFill>
-                  <a:srgbClr val="F92672"/>
+                  <a:schemeClr val="bg1">
+                    <a:lumMod val="95000"/>
+                  </a:schemeClr>
                 </a:solidFill>
                 <a:latin typeface="Monaco" charset="0"/>
               </a:rPr>
@@ -37063,180 +37413,42 @@
             <a:r>
               <a:rPr lang="en-US" sz="2000" dirty="0">
                 <a:solidFill>
-                  <a:srgbClr val="F92672"/>
-                </a:solidFill>
-                <a:latin typeface="Monaco" charset="0"/>
-              </a:rPr>
-              <a:t>title"</a:t>
-            </a:r>
-            <a:r>
-              <a:rPr lang="en-US" sz="2000" dirty="0">
-                <a:solidFill>
-                  <a:srgbClr val="F8F8F2"/>
-                </a:solidFill>
-                <a:latin typeface="Monaco" charset="0"/>
-              </a:rPr>
-              <a:t>: </a:t>
-            </a:r>
-            <a:r>
-              <a:rPr lang="en-US" sz="2000" dirty="0">
-                <a:solidFill>
-                  <a:srgbClr val="E6DB74"/>
-                </a:solidFill>
-                <a:latin typeface="Monaco" charset="0"/>
-              </a:rPr>
-              <a:t>"Hello JSON!"</a:t>
-            </a:r>
-            <a:r>
-              <a:rPr lang="en-US" sz="2000" dirty="0">
-                <a:solidFill>
-                  <a:srgbClr val="F8F8F2"/>
-                </a:solidFill>
-                <a:latin typeface="Monaco" charset="0"/>
-              </a:rPr>
-              <a:t>,</a:t>
-            </a:r>
-          </a:p>
-          <a:p>
-            <a:r>
-              <a:rPr lang="en-US" sz="2000" dirty="0" smtClean="0">
-                <a:solidFill>
-                  <a:srgbClr val="F8F8F2"/>
-                </a:solidFill>
-                <a:latin typeface="Monaco" charset="0"/>
-              </a:rPr>
-              <a:t>  </a:t>
-            </a:r>
-            <a:r>
-              <a:rPr lang="en-US" sz="2000" dirty="0" smtClean="0">
-                <a:solidFill>
-                  <a:srgbClr val="F92672"/>
-                </a:solidFill>
-                <a:latin typeface="Monaco" charset="0"/>
-              </a:rPr>
-              <a:t>"</a:t>
-            </a:r>
-            <a:r>
-              <a:rPr lang="en-US" sz="2000" dirty="0">
-                <a:solidFill>
-                  <a:srgbClr val="F92672"/>
-                </a:solidFill>
-                <a:latin typeface="Monaco" charset="0"/>
-              </a:rPr>
-              <a:t>slug"</a:t>
-            </a:r>
-            <a:r>
-              <a:rPr lang="en-US" sz="2000" dirty="0">
-                <a:solidFill>
-                  <a:srgbClr val="F8F8F2"/>
-                </a:solidFill>
-                <a:latin typeface="Monaco" charset="0"/>
-              </a:rPr>
-              <a:t>: </a:t>
-            </a:r>
-            <a:r>
-              <a:rPr lang="en-US" sz="2000" dirty="0">
-                <a:solidFill>
-                  <a:srgbClr val="E6DB74"/>
-                </a:solidFill>
-                <a:latin typeface="Monaco" charset="0"/>
-              </a:rPr>
-              <a:t>"hello-</a:t>
-            </a:r>
-            <a:r>
-              <a:rPr lang="en-US" sz="2000" dirty="0" err="1">
-                <a:solidFill>
-                  <a:srgbClr val="E6DB74"/>
-                </a:solidFill>
-                <a:latin typeface="Monaco" charset="0"/>
-              </a:rPr>
-              <a:t>json</a:t>
-            </a:r>
-            <a:r>
-              <a:rPr lang="en-US" sz="2000" dirty="0">
-                <a:solidFill>
-                  <a:srgbClr val="E6DB74"/>
-                </a:solidFill>
-                <a:latin typeface="Monaco" charset="0"/>
-              </a:rPr>
-              <a:t>"</a:t>
-            </a:r>
-            <a:r>
-              <a:rPr lang="en-US" sz="2000" dirty="0">
-                <a:solidFill>
-                  <a:srgbClr val="F8F8F2"/>
-                </a:solidFill>
-                <a:latin typeface="Monaco" charset="0"/>
-              </a:rPr>
-              <a:t>,</a:t>
-            </a:r>
-          </a:p>
-          <a:p>
-            <a:r>
-              <a:rPr lang="en-US" sz="2000" dirty="0" smtClean="0">
-                <a:solidFill>
-                  <a:srgbClr val="F8F8F2"/>
-                </a:solidFill>
-                <a:latin typeface="Monaco" charset="0"/>
-              </a:rPr>
-              <a:t>  </a:t>
-            </a:r>
-            <a:r>
-              <a:rPr lang="en-US" sz="2000" dirty="0" smtClean="0">
-                <a:solidFill>
-                  <a:srgbClr val="F92672"/>
-                </a:solidFill>
-                <a:latin typeface="Monaco" charset="0"/>
-              </a:rPr>
-              <a:t>"</a:t>
-            </a:r>
-            <a:r>
-              <a:rPr lang="en-US" sz="2000" dirty="0">
-                <a:solidFill>
-                  <a:srgbClr val="F92672"/>
-                </a:solidFill>
-                <a:latin typeface="Monaco" charset="0"/>
-              </a:rPr>
-              <a:t>content"</a:t>
-            </a:r>
-            <a:r>
-              <a:rPr lang="en-US" sz="2000" dirty="0">
-                <a:solidFill>
-                  <a:srgbClr val="F8F8F2"/>
-                </a:solidFill>
-                <a:latin typeface="Monaco" charset="0"/>
-              </a:rPr>
-              <a:t>: </a:t>
-            </a:r>
-            <a:r>
-              <a:rPr lang="en-US" sz="2000" dirty="0">
-                <a:solidFill>
-                  <a:srgbClr val="E6DB74"/>
-                </a:solidFill>
-                <a:latin typeface="Monaco" charset="0"/>
-              </a:rPr>
-              <a:t>"Some post content goes here."</a:t>
-            </a:r>
-            <a:endParaRPr lang="en-US" sz="2000" dirty="0">
+                  <a:schemeClr val="bg1">
+                    <a:lumMod val="95000"/>
+                  </a:schemeClr>
+                </a:solidFill>
+                <a:latin typeface="Monaco" charset="0"/>
+              </a:rPr>
+              <a:t>content": "Some post content goes here."</a:t>
+            </a:r>
+          </a:p>
+          <a:p>
+            <a:r>
+              <a:rPr lang="mr-IN" sz="2000" dirty="0" smtClean="0">
+                <a:solidFill>
+                  <a:schemeClr val="bg1">
+                    <a:lumMod val="95000"/>
+                  </a:schemeClr>
+                </a:solidFill>
+                <a:latin typeface="Monaco" charset="0"/>
+              </a:rPr>
+              <a:t>}</a:t>
+            </a:r>
+            <a:endParaRPr lang="en-US" sz="2000" dirty="0" smtClean="0">
               <a:solidFill>
-                <a:srgbClr val="F8F8F2"/>
+                <a:schemeClr val="bg1">
+                  <a:lumMod val="95000"/>
+                </a:schemeClr>
               </a:solidFill>
               <a:latin typeface="Monaco" charset="0"/>
             </a:endParaRPr>
           </a:p>
           <a:p>
-            <a:r>
-              <a:rPr lang="mr-IN" sz="2000" dirty="0" smtClean="0">
-                <a:solidFill>
-                  <a:srgbClr val="F8F8F2"/>
-                </a:solidFill>
-                <a:latin typeface="Monaco" charset="0"/>
-              </a:rPr>
-              <a:t>}</a:t>
-            </a:r>
             <a:endParaRPr lang="mr-IN" sz="2000" dirty="0">
               <a:solidFill>
-                <a:srgbClr val="F8F8F2"/>
+                <a:schemeClr val="bg1">
+                  <a:lumMod val="95000"/>
+                </a:schemeClr>
               </a:solidFill>
               <a:latin typeface="Monaco" charset="0"/>
             </a:endParaRPr>
@@ -38251,16 +38463,34 @@
               <a:t> </a:t>
             </a:r>
             <a:r>
+              <a:rPr lang="en-US" sz="2000" dirty="0" smtClean="0">
+                <a:solidFill>
+                  <a:srgbClr val="E6DB74"/>
+                </a:solidFill>
+                <a:latin typeface="Monaco" charset="0"/>
+              </a:rPr>
+              <a:t>'{ </a:t>
+            </a:r>
+            <a:r>
               <a:rPr lang="en-US" sz="2000" dirty="0">
                 <a:solidFill>
                   <a:srgbClr val="E6DB74"/>
                 </a:solidFill>
                 <a:latin typeface="Monaco" charset="0"/>
               </a:rPr>
-              <a:t>'{ "id": 1, "title": "Hello JSON!" }'</a:t>
-            </a:r>
-            <a:r>
-              <a:rPr lang="en-US" sz="2000" dirty="0">
+              <a:t>"id": 1, "title": "Hello JSON!" </a:t>
+            </a:r>
+            <a:r>
+              <a:rPr lang="en-US" sz="2000" dirty="0" smtClean="0">
+                <a:solidFill>
+                  <a:srgbClr val="E6DB74"/>
+                </a:solidFill>
+                <a:latin typeface="Monaco" charset="0"/>
+              </a:rPr>
+              <a:t>}'</a:t>
+            </a:r>
+            <a:r>
+              <a:rPr lang="en-US" sz="2000" dirty="0" smtClean="0">
                 <a:solidFill>
                   <a:srgbClr val="F8F8F2"/>
                 </a:solidFill>
@@ -38268,6 +38498,12 @@
               </a:rPr>
               <a:t>,</a:t>
             </a:r>
+            <a:endParaRPr lang="en-US" sz="2000" dirty="0">
+              <a:solidFill>
+                <a:srgbClr val="F8F8F2"/>
+              </a:solidFill>
+              <a:latin typeface="Monaco" charset="0"/>
+            </a:endParaRPr>
           </a:p>
           <a:p>
             <a:r>
@@ -39342,7 +39578,7 @@
               <a:t>https://</a:t>
             </a:r>
             <a:r>
-              <a:rPr lang="en-US" sz="2000" dirty="0" err="1">
+              <a:rPr lang="en-US" sz="2000" dirty="0" err="1" smtClean="0">
                 <a:solidFill>
                   <a:srgbClr val="A6E22E"/>
                 </a:solidFill>
@@ -39351,7 +39587,7 @@
               <a:t>site.com</a:t>
             </a:r>
             <a:r>
-              <a:rPr lang="en-US" sz="2000" dirty="0">
+              <a:rPr lang="en-US" sz="2000" dirty="0" smtClean="0">
                 <a:solidFill>
                   <a:srgbClr val="A6E22E"/>
                 </a:solidFill>
@@ -39360,16 +39596,43 @@
               <a:t>/</a:t>
             </a:r>
             <a:r>
-              <a:rPr lang="en-US" sz="2000" dirty="0" err="1">
+              <a:rPr lang="en-US" sz="2000" dirty="0" err="1" smtClean="0">
                 <a:solidFill>
                   <a:srgbClr val="A6E22E"/>
                 </a:solidFill>
                 <a:latin typeface="Monaco" charset="0"/>
               </a:rPr>
-              <a:t>posts.json</a:t>
-            </a:r>
-            <a:r>
-              <a:rPr lang="en-US" sz="2000" dirty="0">
+              <a:t>wp-json</a:t>
+            </a:r>
+            <a:r>
+              <a:rPr lang="en-US" sz="2000" dirty="0" smtClean="0">
+                <a:solidFill>
+                  <a:srgbClr val="A6E22E"/>
+                </a:solidFill>
+                <a:latin typeface="Monaco" charset="0"/>
+              </a:rPr>
+              <a:t>/</a:t>
+            </a:r>
+            <a:r>
+              <a:rPr lang="en-US" sz="2000" dirty="0" err="1" smtClean="0">
+                <a:solidFill>
+                  <a:srgbClr val="A6E22E"/>
+                </a:solidFill>
+                <a:latin typeface="Monaco" charset="0"/>
+              </a:rPr>
+              <a:t>wp</a:t>
+            </a:r>
+            <a:r>
+              <a:rPr lang="en-US" sz="2000" dirty="0" smtClean="0">
+                <a:solidFill>
+                  <a:srgbClr val="A6E22E"/>
+                </a:solidFill>
+                <a:latin typeface="Monaco" charset="0"/>
+              </a:rPr>
+              <a:t>/v2/posts</a:t>
+            </a:r>
+            <a:r>
+              <a:rPr lang="en-US" sz="2000" dirty="0" smtClean="0">
                 <a:solidFill>
                   <a:srgbClr val="960050"/>
                 </a:solidFill>
@@ -39378,7 +39641,7 @@
               <a:t>’</a:t>
             </a:r>
             <a:r>
-              <a:rPr lang="en-US" sz="2000" dirty="0">
+              <a:rPr lang="en-US" sz="2000" dirty="0" smtClean="0">
                 <a:solidFill>
                   <a:srgbClr val="75715E"/>
                 </a:solidFill>
@@ -40013,7 +40276,7 @@
         </p:nvSpPr>
         <p:spPr>
           <a:xfrm>
-            <a:off x="609600" y="932688"/>
+            <a:off x="609600" y="886968"/>
             <a:ext cx="8534400" cy="3831644"/>
           </a:xfrm>
         </p:spPr>
@@ -40050,40 +40313,76 @@
               <a:t>( </a:t>
             </a:r>
             <a:r>
+              <a:rPr lang="en-US" sz="1800" dirty="0" smtClean="0">
+                <a:solidFill>
+                  <a:srgbClr val="E6DB74"/>
+                </a:solidFill>
+                <a:latin typeface="Monaco" charset="0"/>
+              </a:rPr>
+              <a:t>'https</a:t>
+            </a:r>
+            <a:r>
+              <a:rPr lang="en-US" sz="1800" dirty="0" smtClean="0">
+                <a:solidFill>
+                  <a:srgbClr val="E6DB74"/>
+                </a:solidFill>
+                <a:latin typeface="Monaco" charset="0"/>
+              </a:rPr>
+              <a:t>://</a:t>
+            </a:r>
+            <a:r>
               <a:rPr lang="en-US" sz="1800" dirty="0" err="1" smtClean="0">
                 <a:solidFill>
-                  <a:srgbClr val="A6E22E"/>
-                </a:solidFill>
-                <a:latin typeface="Monaco" charset="0"/>
-              </a:rPr>
-              <a:t>apiURL</a:t>
+                  <a:srgbClr val="E6DB74"/>
+                </a:solidFill>
+                <a:latin typeface="Monaco" charset="0"/>
+              </a:rPr>
+              <a:t>site.com</a:t>
             </a:r>
             <a:r>
               <a:rPr lang="en-US" sz="1800" dirty="0" smtClean="0">
                 <a:solidFill>
-                  <a:srgbClr val="F8F8F2"/>
-                </a:solidFill>
-                <a:latin typeface="Monaco" charset="0"/>
-              </a:rPr>
-              <a:t> </a:t>
+                  <a:srgbClr val="E6DB74"/>
+                </a:solidFill>
+                <a:latin typeface="Monaco" charset="0"/>
+              </a:rPr>
+              <a:t>/</a:t>
+            </a:r>
+            <a:r>
+              <a:rPr lang="en-US" sz="1800" dirty="0" err="1" smtClean="0">
+                <a:solidFill>
+                  <a:srgbClr val="E6DB74"/>
+                </a:solidFill>
+                <a:latin typeface="Monaco" charset="0"/>
+              </a:rPr>
+              <a:t>wp-json</a:t>
             </a:r>
             <a:r>
               <a:rPr lang="en-US" sz="1800" dirty="0" smtClean="0">
                 <a:solidFill>
-                  <a:srgbClr val="F92672"/>
-                </a:solidFill>
-                <a:latin typeface="Monaco" charset="0"/>
-              </a:rPr>
-              <a:t>+</a:t>
+                  <a:srgbClr val="E6DB74"/>
+                </a:solidFill>
+                <a:latin typeface="Monaco" charset="0"/>
+              </a:rPr>
+              <a:t>/</a:t>
+            </a:r>
+            <a:r>
+              <a:rPr lang="en-US" sz="1800" dirty="0" err="1" smtClean="0">
+                <a:solidFill>
+                  <a:srgbClr val="E6DB74"/>
+                </a:solidFill>
+                <a:latin typeface="Monaco" charset="0"/>
+              </a:rPr>
+              <a:t>wp</a:t>
             </a:r>
             <a:r>
               <a:rPr lang="en-US" sz="1800" dirty="0" smtClean="0">
                 <a:solidFill>
-                  <a:srgbClr val="F8F8F2"/>
-                </a:solidFill>
-                <a:latin typeface="Monaco" charset="0"/>
-              </a:rPr>
-              <a:t> </a:t>
+                  <a:srgbClr val="E6DB74"/>
+                </a:solidFill>
+                <a:latin typeface="Monaco" charset="0"/>
+              </a:rPr>
+              <a:t>/v2/posts</a:t>
             </a:r>
             <a:r>
               <a:rPr lang="en-US" sz="1800" dirty="0">
@@ -40092,25 +40391,7 @@
                 </a:solidFill>
                 <a:latin typeface="Monaco" charset="0"/>
               </a:rPr>
-              <a:t>'/</a:t>
-            </a:r>
-            <a:r>
-              <a:rPr lang="en-US" sz="1800" dirty="0" err="1">
-                <a:solidFill>
-                  <a:srgbClr val="E6DB74"/>
-                </a:solidFill>
-                <a:latin typeface="Monaco" charset="0"/>
-              </a:rPr>
-              <a:t>wp</a:t>
-            </a:r>
-            <a:r>
-              <a:rPr lang="en-US" sz="1800" dirty="0">
-                <a:solidFill>
-                  <a:srgbClr val="E6DB74"/>
-                </a:solidFill>
-                <a:latin typeface="Monaco" charset="0"/>
-              </a:rPr>
-              <a:t>/v2/posts'</a:t>
+              <a:t>'</a:t>
             </a:r>
             <a:r>
               <a:rPr lang="en-US" sz="1800" dirty="0">
@@ -41990,7 +42271,11 @@
           <a:p>
             <a:r>
               <a:rPr lang="en-US" dirty="0" smtClean="0"/>
-              <a:t>JSON Practice #1</a:t>
+              <a:t>JSON Practice </a:t>
+            </a:r>
+            <a:r>
+              <a:rPr lang="en-US" dirty="0" smtClean="0"/>
+              <a:t>03.01</a:t>
             </a:r>
             <a:endParaRPr lang="en-US" dirty="0"/>
           </a:p>
@@ -42113,7 +42398,11 @@
           <a:p>
             <a:r>
               <a:rPr lang="en-US" dirty="0" smtClean="0"/>
-              <a:t>JSON Practice #2</a:t>
+              <a:t>JSON Practice </a:t>
+            </a:r>
+            <a:r>
+              <a:rPr lang="en-US" dirty="0" smtClean="0"/>
+              <a:t>03.02</a:t>
             </a:r>
             <a:endParaRPr lang="en-US" dirty="0"/>
           </a:p>
@@ -42236,7 +42525,11 @@
           <a:p>
             <a:r>
               <a:rPr lang="en-US" dirty="0" smtClean="0"/>
-              <a:t>JSON Practice #3</a:t>
+              <a:t>JSON Practice </a:t>
+            </a:r>
+            <a:r>
+              <a:rPr lang="en-US" dirty="0" smtClean="0"/>
+              <a:t>03.03</a:t>
             </a:r>
             <a:endParaRPr lang="en-US" dirty="0"/>
           </a:p>
@@ -42515,6 +42808,497 @@
     <p:bldLst>
       <p:bldP spid="2" grpId="0"/>
     </p:bldLst>
+  </p:timing>
+</p:sld>
+</file>
+
+<file path=ppt/slides/slide90.xml><?xml version="1.0" encoding="utf-8"?>
+<p:sld xmlns:a="http://schemas.openxmlformats.org/drawingml/2006/main" xmlns:r="http://schemas.openxmlformats.org/officeDocument/2006/relationships" xmlns:p="http://schemas.openxmlformats.org/presentationml/2006/main">
+  <p:cSld>
+    <p:spTree>
+      <p:nvGrpSpPr>
+        <p:cNvPr id="1" name=""/>
+        <p:cNvGrpSpPr/>
+        <p:nvPr/>
+      </p:nvGrpSpPr>
+      <p:grpSpPr>
+        <a:xfrm>
+          <a:off x="0" y="0"/>
+          <a:ext cx="0" cy="0"/>
+          <a:chOff x="0" y="0"/>
+          <a:chExt cx="0" cy="0"/>
+        </a:xfrm>
+      </p:grpSpPr>
+      <p:sp>
+        <p:nvSpPr>
+          <p:cNvPr id="2" name="Title 1"/>
+          <p:cNvSpPr>
+            <a:spLocks noGrp="1"/>
+          </p:cNvSpPr>
+          <p:nvPr>
+            <p:ph type="title"/>
+          </p:nvPr>
+        </p:nvSpPr>
+        <p:spPr/>
+        <p:txBody>
+          <a:bodyPr/>
+          <a:lstStyle/>
+          <a:p>
+            <a:r>
+              <a:rPr lang="en-US" dirty="0" smtClean="0"/>
+              <a:t>WP API + JS in a Theme</a:t>
+            </a:r>
+            <a:endParaRPr lang="en-US" dirty="0"/>
+          </a:p>
+        </p:txBody>
+      </p:sp>
+      <p:sp>
+        <p:nvSpPr>
+          <p:cNvPr id="3" name="Content Placeholder 2"/>
+          <p:cNvSpPr>
+            <a:spLocks noGrp="1"/>
+          </p:cNvSpPr>
+          <p:nvPr>
+            <p:ph idx="1"/>
+          </p:nvPr>
+        </p:nvSpPr>
+        <p:spPr>
+          <a:xfrm>
+            <a:off x="609600" y="1392860"/>
+            <a:ext cx="7924800" cy="3181293"/>
+          </a:xfrm>
+        </p:spPr>
+        <p:txBody>
+          <a:bodyPr/>
+          <a:lstStyle/>
+          <a:p>
+            <a:pPr marL="457200" indent="-457200">
+              <a:buFont typeface="+mj-lt"/>
+              <a:buAutoNum type="arabicPeriod"/>
+            </a:pPr>
+            <a:r>
+              <a:rPr lang="en-US" smtClean="0"/>
+              <a:t>Add </a:t>
+            </a:r>
+            <a:r>
+              <a:rPr lang="en-US" dirty="0" smtClean="0"/>
+              <a:t>the </a:t>
+            </a:r>
+            <a:r>
+              <a:rPr lang="en-US" dirty="0" err="1" smtClean="0"/>
+              <a:t>apidemo.zip</a:t>
+            </a:r>
+            <a:r>
+              <a:rPr lang="en-US" dirty="0" smtClean="0"/>
+              <a:t> theme to your WP site</a:t>
+            </a:r>
+            <a:endParaRPr lang="en-US" dirty="0" smtClean="0"/>
+          </a:p>
+          <a:p>
+            <a:pPr marL="457200" indent="-457200">
+              <a:buFont typeface="+mj-lt"/>
+              <a:buAutoNum type="arabicPeriod"/>
+            </a:pPr>
+            <a:r>
+              <a:rPr lang="en-US" dirty="0" err="1" smtClean="0"/>
+              <a:t>Functions.php</a:t>
+            </a:r>
+            <a:r>
+              <a:rPr lang="en-US" dirty="0" smtClean="0"/>
+              <a:t> </a:t>
+            </a:r>
+            <a:r>
+              <a:rPr lang="en-US" dirty="0" err="1" smtClean="0"/>
+              <a:t>enqueue</a:t>
+            </a:r>
+            <a:r>
+              <a:rPr lang="en-US" dirty="0" smtClean="0"/>
+              <a:t> </a:t>
+            </a:r>
+            <a:r>
+              <a:rPr lang="en-US" dirty="0" err="1" smtClean="0"/>
+              <a:t>main.js</a:t>
+            </a:r>
+            <a:r>
+              <a:rPr lang="en-US" dirty="0"/>
+              <a:t> </a:t>
+            </a:r>
+            <a:r>
+              <a:rPr lang="en-US" dirty="0" smtClean="0"/>
+              <a:t>with dependency of </a:t>
+            </a:r>
+            <a:r>
+              <a:rPr lang="en-US" dirty="0" err="1" smtClean="0"/>
+              <a:t>wp-api</a:t>
+            </a:r>
+            <a:r>
+              <a:rPr lang="en-US" dirty="0" smtClean="0"/>
+              <a:t> and </a:t>
+            </a:r>
+            <a:r>
+              <a:rPr lang="en-US" dirty="0" err="1" smtClean="0"/>
+              <a:t>jquery</a:t>
+            </a:r>
+            <a:endParaRPr lang="en-US" dirty="0" smtClean="0"/>
+          </a:p>
+          <a:p>
+            <a:pPr marL="457200" indent="-457200">
+              <a:buFont typeface="+mj-lt"/>
+              <a:buAutoNum type="arabicPeriod"/>
+            </a:pPr>
+            <a:r>
+              <a:rPr lang="en-US" dirty="0"/>
+              <a:t>Use new </a:t>
+            </a:r>
+            <a:r>
+              <a:rPr lang="en-US" dirty="0" err="1"/>
+              <a:t>wp.api.collections.Posts</a:t>
+            </a:r>
+            <a:r>
+              <a:rPr lang="en-US" dirty="0" smtClean="0"/>
+              <a:t>() and .fetch to get posts from WP Site</a:t>
+            </a:r>
+          </a:p>
+          <a:p>
+            <a:pPr marL="457200" indent="-457200">
+              <a:buFont typeface="+mj-lt"/>
+              <a:buAutoNum type="arabicPeriod"/>
+            </a:pPr>
+            <a:r>
+              <a:rPr lang="en-US" dirty="0"/>
+              <a:t>Use </a:t>
+            </a:r>
+            <a:r>
+              <a:rPr lang="en-US" dirty="0" smtClean="0"/>
+              <a:t>JavaScript (and jQuery) to add the posts to the page</a:t>
+            </a:r>
+          </a:p>
+        </p:txBody>
+      </p:sp>
+      <p:sp>
+        <p:nvSpPr>
+          <p:cNvPr id="4" name="Content Placeholder 3"/>
+          <p:cNvSpPr>
+            <a:spLocks noGrp="1"/>
+          </p:cNvSpPr>
+          <p:nvPr>
+            <p:ph sz="quarter" idx="11"/>
+          </p:nvPr>
+        </p:nvSpPr>
+        <p:spPr/>
+        <p:txBody>
+          <a:bodyPr/>
+          <a:lstStyle/>
+          <a:p>
+            <a:r>
+              <a:rPr lang="en-US" dirty="0" smtClean="0"/>
+              <a:t>WP API + JS in a Theme</a:t>
+            </a:r>
+            <a:endParaRPr lang="en-US" dirty="0"/>
+          </a:p>
+        </p:txBody>
+      </p:sp>
+    </p:spTree>
+    <p:extLst>
+      <p:ext uri="{BB962C8B-B14F-4D97-AF65-F5344CB8AC3E}">
+        <p14:creationId xmlns:p14="http://schemas.microsoft.com/office/powerpoint/2010/main" val="1632095686"/>
+      </p:ext>
+    </p:extLst>
+  </p:cSld>
+  <p:clrMapOvr>
+    <a:masterClrMapping/>
+  </p:clrMapOvr>
+  <p:timing>
+    <p:tnLst>
+      <p:par>
+        <p:cTn id="1" dur="indefinite" restart="never" nodeType="tmRoot"/>
+      </p:par>
+    </p:tnLst>
+  </p:timing>
+</p:sld>
+</file>
+
+<file path=ppt/slides/slide91.xml><?xml version="1.0" encoding="utf-8"?>
+<p:sld xmlns:a="http://schemas.openxmlformats.org/drawingml/2006/main" xmlns:r="http://schemas.openxmlformats.org/officeDocument/2006/relationships" xmlns:p="http://schemas.openxmlformats.org/presentationml/2006/main">
+  <p:cSld>
+    <p:spTree>
+      <p:nvGrpSpPr>
+        <p:cNvPr id="1" name=""/>
+        <p:cNvGrpSpPr/>
+        <p:nvPr/>
+      </p:nvGrpSpPr>
+      <p:grpSpPr>
+        <a:xfrm>
+          <a:off x="0" y="0"/>
+          <a:ext cx="0" cy="0"/>
+          <a:chOff x="0" y="0"/>
+          <a:chExt cx="0" cy="0"/>
+        </a:xfrm>
+      </p:grpSpPr>
+      <p:sp>
+        <p:nvSpPr>
+          <p:cNvPr id="2" name="Title 1"/>
+          <p:cNvSpPr>
+            <a:spLocks noGrp="1"/>
+          </p:cNvSpPr>
+          <p:nvPr>
+            <p:ph type="ctrTitle"/>
+          </p:nvPr>
+        </p:nvSpPr>
+        <p:spPr/>
+        <p:txBody>
+          <a:bodyPr/>
+          <a:lstStyle/>
+          <a:p>
+            <a:r>
+              <a:rPr lang="en-US" sz="4200" dirty="0"/>
+              <a:t>A Day of </a:t>
+            </a:r>
+            <a:r>
+              <a:rPr lang="en-US" sz="4200" dirty="0" smtClean="0"/>
+              <a:t>JavaScript </a:t>
+            </a:r>
+            <a:endParaRPr lang="en-US" sz="4200" dirty="0">
+              <a:latin typeface="Pacifico" charset="0"/>
+              <a:ea typeface="Pacifico" charset="0"/>
+              <a:cs typeface="Pacifico" charset="0"/>
+            </a:endParaRPr>
+          </a:p>
+        </p:txBody>
+      </p:sp>
+      <p:sp>
+        <p:nvSpPr>
+          <p:cNvPr id="3" name="Content Placeholder 2"/>
+          <p:cNvSpPr>
+            <a:spLocks noGrp="1"/>
+          </p:cNvSpPr>
+          <p:nvPr>
+            <p:ph sz="quarter" idx="11"/>
+          </p:nvPr>
+        </p:nvSpPr>
+        <p:spPr/>
+        <p:txBody>
+          <a:bodyPr/>
+          <a:lstStyle/>
+          <a:p>
+            <a:r>
+              <a:rPr lang="en-US" dirty="0" smtClean="0"/>
+              <a:t>Wrap Up</a:t>
+            </a:r>
+            <a:endParaRPr lang="en-US" dirty="0"/>
+          </a:p>
+        </p:txBody>
+      </p:sp>
+      <p:sp>
+        <p:nvSpPr>
+          <p:cNvPr id="4" name="Rectangle 3"/>
+          <p:cNvSpPr/>
+          <p:nvPr/>
+        </p:nvSpPr>
+        <p:spPr>
+          <a:xfrm>
+            <a:off x="4027620" y="1871972"/>
+            <a:ext cx="1088760" cy="461665"/>
+          </a:xfrm>
+          <a:prstGeom prst="rect">
+            <a:avLst/>
+          </a:prstGeom>
+        </p:spPr>
+        <p:txBody>
+          <a:bodyPr wrap="none">
+            <a:spAutoFit/>
+          </a:bodyPr>
+          <a:lstStyle/>
+          <a:p>
+            <a:r>
+              <a:rPr lang="en-US" sz="2400">
+                <a:solidFill>
+                  <a:schemeClr val="bg1">
+                    <a:lumMod val="95000"/>
+                  </a:schemeClr>
+                </a:solidFill>
+                <a:latin typeface="Pacifico" charset="0"/>
+                <a:ea typeface="Pacifico" charset="0"/>
+                <a:cs typeface="Pacifico" charset="0"/>
+              </a:rPr>
+              <a:t>Review</a:t>
+            </a:r>
+            <a:endParaRPr lang="en-US" sz="2400">
+              <a:solidFill>
+                <a:schemeClr val="bg1">
+                  <a:lumMod val="95000"/>
+                </a:schemeClr>
+              </a:solidFill>
+            </a:endParaRPr>
+          </a:p>
+        </p:txBody>
+      </p:sp>
+    </p:spTree>
+    <p:extLst>
+      <p:ext uri="{BB962C8B-B14F-4D97-AF65-F5344CB8AC3E}">
+        <p14:creationId xmlns:p14="http://schemas.microsoft.com/office/powerpoint/2010/main" val="1822307990"/>
+      </p:ext>
+    </p:extLst>
+  </p:cSld>
+  <p:clrMapOvr>
+    <a:masterClrMapping/>
+  </p:clrMapOvr>
+  <p:timing>
+    <p:tnLst>
+      <p:par>
+        <p:cTn id="1" dur="indefinite" restart="never" nodeType="tmRoot"/>
+      </p:par>
+    </p:tnLst>
+  </p:timing>
+</p:sld>
+</file>
+
+<file path=ppt/slides/slide92.xml><?xml version="1.0" encoding="utf-8"?>
+<p:sld xmlns:a="http://schemas.openxmlformats.org/drawingml/2006/main" xmlns:r="http://schemas.openxmlformats.org/officeDocument/2006/relationships" xmlns:p="http://schemas.openxmlformats.org/presentationml/2006/main">
+  <p:cSld>
+    <p:spTree>
+      <p:nvGrpSpPr>
+        <p:cNvPr id="1" name=""/>
+        <p:cNvGrpSpPr/>
+        <p:nvPr/>
+      </p:nvGrpSpPr>
+      <p:grpSpPr>
+        <a:xfrm>
+          <a:off x="0" y="0"/>
+          <a:ext cx="0" cy="0"/>
+          <a:chOff x="0" y="0"/>
+          <a:chExt cx="0" cy="0"/>
+        </a:xfrm>
+      </p:grpSpPr>
+      <p:sp>
+        <p:nvSpPr>
+          <p:cNvPr id="2" name="Title 1"/>
+          <p:cNvSpPr>
+            <a:spLocks noGrp="1"/>
+          </p:cNvSpPr>
+          <p:nvPr>
+            <p:ph type="title"/>
+          </p:nvPr>
+        </p:nvSpPr>
+        <p:spPr/>
+        <p:txBody>
+          <a:bodyPr/>
+          <a:lstStyle/>
+          <a:p>
+            <a:r>
+              <a:rPr lang="en-US" dirty="0"/>
+              <a:t>A Day of </a:t>
+            </a:r>
+            <a:r>
+              <a:rPr lang="en-US" dirty="0" smtClean="0"/>
+              <a:t>JavaScript Review</a:t>
+            </a:r>
+            <a:endParaRPr lang="en-US" dirty="0"/>
+          </a:p>
+        </p:txBody>
+      </p:sp>
+      <p:sp>
+        <p:nvSpPr>
+          <p:cNvPr id="3" name="Content Placeholder 2"/>
+          <p:cNvSpPr>
+            <a:spLocks noGrp="1"/>
+          </p:cNvSpPr>
+          <p:nvPr>
+            <p:ph idx="1"/>
+          </p:nvPr>
+        </p:nvSpPr>
+        <p:spPr>
+          <a:xfrm>
+            <a:off x="609600" y="1392860"/>
+            <a:ext cx="7924800" cy="3181293"/>
+          </a:xfrm>
+        </p:spPr>
+        <p:txBody>
+          <a:bodyPr/>
+          <a:lstStyle/>
+          <a:p>
+            <a:pPr marL="457200" indent="-457200">
+              <a:buFont typeface="+mj-lt"/>
+              <a:buAutoNum type="arabicPeriod"/>
+            </a:pPr>
+            <a:r>
+              <a:rPr lang="en-US" dirty="0" smtClean="0"/>
+              <a:t>Programming </a:t>
+            </a:r>
+            <a:r>
+              <a:rPr lang="en-US" dirty="0"/>
+              <a:t>R</a:t>
+            </a:r>
+            <a:r>
+              <a:rPr lang="en-US" dirty="0" smtClean="0"/>
+              <a:t>eview: variables, arrays, functions, objects, loops, conditional statements</a:t>
+            </a:r>
+          </a:p>
+          <a:p>
+            <a:pPr marL="457200" indent="-457200">
+              <a:buFont typeface="+mj-lt"/>
+              <a:buAutoNum type="arabicPeriod"/>
+            </a:pPr>
+            <a:r>
+              <a:rPr lang="en-US" dirty="0" smtClean="0"/>
+              <a:t>The Document Object Model: </a:t>
+            </a:r>
+          </a:p>
+          <a:p>
+            <a:pPr marL="457200" indent="-457200">
+              <a:buFont typeface="+mj-lt"/>
+              <a:buAutoNum type="arabicPeriod"/>
+            </a:pPr>
+            <a:endParaRPr lang="en-US" dirty="0" smtClean="0"/>
+          </a:p>
+          <a:p>
+            <a:pPr marL="457200" indent="-457200">
+              <a:buFont typeface="+mj-lt"/>
+              <a:buAutoNum type="arabicPeriod"/>
+            </a:pPr>
+            <a:endParaRPr lang="en-US" dirty="0" smtClean="0"/>
+          </a:p>
+        </p:txBody>
+      </p:sp>
+      <p:sp>
+        <p:nvSpPr>
+          <p:cNvPr id="4" name="Content Placeholder 3"/>
+          <p:cNvSpPr>
+            <a:spLocks noGrp="1"/>
+          </p:cNvSpPr>
+          <p:nvPr>
+            <p:ph sz="quarter" idx="11"/>
+          </p:nvPr>
+        </p:nvSpPr>
+        <p:spPr/>
+        <p:txBody>
+          <a:bodyPr/>
+          <a:lstStyle/>
+          <a:p>
+            <a:r>
+              <a:rPr lang="en-US" dirty="0" smtClean="0"/>
+              <a:t>WP API + JS in a Theme</a:t>
+            </a:r>
+            <a:endParaRPr lang="en-US" dirty="0"/>
+          </a:p>
+        </p:txBody>
+      </p:sp>
+    </p:spTree>
+    <p:extLst>
+      <p:ext uri="{BB962C8B-B14F-4D97-AF65-F5344CB8AC3E}">
+        <p14:creationId xmlns:p14="http://schemas.microsoft.com/office/powerpoint/2010/main" val="14731716"/>
+      </p:ext>
+    </p:extLst>
+  </p:cSld>
+  <p:clrMapOvr>
+    <a:masterClrMapping/>
+  </p:clrMapOvr>
+  <p:timing>
+    <p:tnLst>
+      <p:par>
+        <p:cTn id="1" dur="indefinite" restart="never" nodeType="tmRoot"/>
+      </p:par>
+    </p:tnLst>
   </p:timing>
 </p:sld>
 </file>

</xml_diff>